<commit_message>
fixed some errors and typos
</commit_message>
<xml_diff>
--- a/docs/cdm16.pptx
+++ b/docs/cdm16.pptx
@@ -5516,7 +5516,7 @@
             </a:r>
             <a:r>
               <a:rPr lang="en-US" dirty="0" err="1"/>
-              <a:t>ldw</a:t>
+              <a:t>lsw</a:t>
             </a:r>
             <a:r>
               <a:rPr lang="ru-RU" dirty="0"/>
@@ -5640,7 +5640,7 @@
         </p:nvSpPr>
         <p:spPr>
           <a:xfrm>
-            <a:off x="3843528" y="2287715"/>
+            <a:off x="3128605" y="2287715"/>
             <a:ext cx="1560576" cy="372269"/>
           </a:xfrm>
           <a:prstGeom prst="rect">
@@ -5688,7 +5688,7 @@
         </p:nvSpPr>
         <p:spPr>
           <a:xfrm>
-            <a:off x="3121152" y="2287715"/>
+            <a:off x="4696634" y="2287715"/>
             <a:ext cx="780288" cy="377952"/>
           </a:xfrm>
           <a:prstGeom prst="rect">
@@ -10857,15 +10857,7 @@
             </a:r>
             <a:r>
               <a:rPr lang="ru-RU" dirty="0"/>
-              <a:t>байт, </a:t>
-            </a:r>
-            <a:r>
-              <a:rPr lang="ru-RU" dirty="0" err="1"/>
-              <a:t>расширеный</a:t>
-            </a:r>
-            <a:r>
-              <a:rPr lang="ru-RU" dirty="0"/>
-              <a:t> нулями) и </a:t>
+              <a:t>байт, расширенный нулями) и </a:t>
             </a:r>
             <a:r>
               <a:rPr lang="en-US" dirty="0"/>
@@ -10942,6 +10934,53 @@
             <a:r>
               <a:rPr lang="en-US" dirty="0"/>
               <a:t>rs0+rs1)</a:t>
+            </a:r>
+          </a:p>
+          <a:p>
+            <a:pPr lvl="1"/>
+            <a:r>
+              <a:rPr lang="en-US" dirty="0" err="1"/>
+              <a:t>ld</a:t>
+            </a:r>
+            <a:r>
+              <a:rPr lang="en-US" dirty="0"/>
+              <a:t>*/</a:t>
+            </a:r>
+            <a:r>
+              <a:rPr lang="en-US" dirty="0" err="1"/>
+              <a:t>st</a:t>
+            </a:r>
+            <a:r>
+              <a:rPr lang="en-US" dirty="0"/>
+              <a:t>* </a:t>
+            </a:r>
+            <a:r>
+              <a:rPr lang="en-US" dirty="0" err="1"/>
+              <a:t>rs</a:t>
+            </a:r>
+            <a:r>
+              <a:rPr lang="en-US" dirty="0"/>
+              <a:t>, </a:t>
+            </a:r>
+            <a:r>
+              <a:rPr lang="en-US" dirty="0" err="1"/>
+              <a:t>rd</a:t>
+            </a:r>
+            <a:r>
+              <a:rPr lang="en-US" dirty="0"/>
+              <a:t> (</a:t>
+            </a:r>
+            <a:r>
+              <a:rPr lang="ru-RU" dirty="0"/>
+              <a:t>адрес равен  </a:t>
+            </a:r>
+            <a:r>
+              <a:rPr lang="en-US" dirty="0" err="1"/>
+              <a:t>rs</a:t>
+            </a:r>
+            <a:r>
+              <a:rPr lang="en-US" dirty="0"/>
+              <a:t>)</a:t>
             </a:r>
           </a:p>
           <a:p>
@@ -11191,7 +11230,7 @@
         <p:spPr/>
         <p:txBody>
           <a:bodyPr>
-            <a:normAutofit lnSpcReduction="10000"/>
+            <a:normAutofit/>
           </a:bodyPr>
           <a:lstStyle/>
           <a:p>
@@ -11287,35 +11326,26 @@
               <a:rPr lang="ru-RU" dirty="0"/>
             </a:br>
             <a:r>
-              <a:rPr lang="ru-RU" dirty="0"/>
-              <a:t>можно реализовать как </a:t>
-            </a:r>
-            <a:br>
-              <a:rPr lang="en-US" dirty="0"/>
-            </a:br>
-            <a:r>
-              <a:rPr lang="en-US" dirty="0"/>
-              <a:t>  push </a:t>
-            </a:r>
-            <a:r>
               <a:rPr lang="en-US" dirty="0" err="1"/>
-              <a:t>rd</a:t>
-            </a:r>
-            <a:br>
-              <a:rPr lang="en-US" dirty="0"/>
-            </a:br>
-            <a:r>
-              <a:rPr lang="en-US" dirty="0"/>
-              <a:t>  </a:t>
+              <a:t>stpc</a:t>
+            </a:r>
+            <a:r>
+              <a:rPr lang="en-US" dirty="0"/>
+              <a:t> </a:t>
             </a:r>
             <a:r>
               <a:rPr lang="en-US" dirty="0" err="1"/>
-              <a:t>popc</a:t>
-            </a:r>
-            <a:r>
-              <a:rPr lang="ru-RU" dirty="0"/>
-              <a:t> </a:t>
-            </a:r>
+              <a:t>rs</a:t>
+            </a:r>
+            <a:r>
+              <a:rPr lang="en-US" dirty="0"/>
+              <a:t> -&gt; pc := </a:t>
+            </a:r>
+            <a:r>
+              <a:rPr lang="en-US" dirty="0" err="1"/>
+              <a:t>rs</a:t>
+            </a:r>
+            <a:endParaRPr lang="ru-RU" dirty="0"/>
           </a:p>
         </p:txBody>
       </p:sp>

</xml_diff>